<commit_message>
Rebuild pages at 3c2a6ae862feefc71e20003ca582812ef4efb405
</commit_message>
<xml_diff>
--- a/images/ArchiveDiagram.png.pptx
+++ b/images/ArchiveDiagram.png.pptx
@@ -175,7 +175,7 @@
             </a:lvl1pPr>
           </a:lstStyle>
           <a:p>
-            <a:endParaRPr lang="en-US"/>
+            <a:endParaRPr lang="en-US" dirty="0"/>
           </a:p>
         </p:txBody>
       </p:sp>
@@ -208,9 +208,9 @@
           <a:p>
             <a:fld id="{F5CC4B3F-88C1-4FFA-B1B6-F41C21DC6924}" type="datetimeFigureOut">
               <a:rPr lang="en-US" smtClean="0"/>
-              <a:t>11/10/18</a:t>
+              <a:t>11/12/18</a:t>
             </a:fld>
-            <a:endParaRPr lang="en-US"/>
+            <a:endParaRPr lang="en-US" dirty="0"/>
           </a:p>
         </p:txBody>
       </p:sp>
@@ -243,7 +243,7 @@
           <a:bodyPr vert="horz" lIns="91440" tIns="45720" rIns="91440" bIns="45720" rtlCol="0" anchor="ctr"/>
           <a:lstStyle/>
           <a:p>
-            <a:endParaRPr lang="en-US"/>
+            <a:endParaRPr lang="en-US" dirty="0"/>
           </a:p>
         </p:txBody>
       </p:sp>
@@ -333,7 +333,7 @@
             </a:lvl1pPr>
           </a:lstStyle>
           <a:p>
-            <a:endParaRPr lang="en-US"/>
+            <a:endParaRPr lang="en-US" dirty="0"/>
           </a:p>
         </p:txBody>
       </p:sp>
@@ -368,7 +368,7 @@
               <a:rPr lang="en-US" smtClean="0"/>
               <a:t>‹#›</a:t>
             </a:fld>
-            <a:endParaRPr lang="en-US"/>
+            <a:endParaRPr lang="en-US" dirty="0"/>
           </a:p>
         </p:txBody>
       </p:sp>
@@ -654,9 +654,9 @@
           <a:p>
             <a:fld id="{78C97017-6FC3-485B-9764-EAC9E56C1D49}" type="datetimeFigureOut">
               <a:rPr lang="en-US" smtClean="0"/>
-              <a:t>11/10/18</a:t>
+              <a:t>11/12/18</a:t>
             </a:fld>
-            <a:endParaRPr lang="en-US"/>
+            <a:endParaRPr lang="en-US" dirty="0"/>
           </a:p>
         </p:txBody>
       </p:sp>
@@ -675,7 +675,7 @@
           <a:bodyPr/>
           <a:lstStyle/>
           <a:p>
-            <a:endParaRPr lang="en-US"/>
+            <a:endParaRPr lang="en-US" dirty="0"/>
           </a:p>
         </p:txBody>
       </p:sp>
@@ -698,7 +698,7 @@
               <a:rPr lang="en-US" smtClean="0"/>
               <a:t>‹#›</a:t>
             </a:fld>
-            <a:endParaRPr lang="en-US"/>
+            <a:endParaRPr lang="en-US" dirty="0"/>
           </a:p>
         </p:txBody>
       </p:sp>
@@ -822,9 +822,9 @@
           <a:p>
             <a:fld id="{78C97017-6FC3-485B-9764-EAC9E56C1D49}" type="datetimeFigureOut">
               <a:rPr lang="en-US" smtClean="0"/>
-              <a:t>11/10/18</a:t>
+              <a:t>11/12/18</a:t>
             </a:fld>
-            <a:endParaRPr lang="en-US"/>
+            <a:endParaRPr lang="en-US" dirty="0"/>
           </a:p>
         </p:txBody>
       </p:sp>
@@ -843,7 +843,7 @@
           <a:bodyPr/>
           <a:lstStyle/>
           <a:p>
-            <a:endParaRPr lang="en-US"/>
+            <a:endParaRPr lang="en-US" dirty="0"/>
           </a:p>
         </p:txBody>
       </p:sp>
@@ -866,7 +866,7 @@
               <a:rPr lang="en-US" smtClean="0"/>
               <a:t>‹#›</a:t>
             </a:fld>
-            <a:endParaRPr lang="en-US"/>
+            <a:endParaRPr lang="en-US" dirty="0"/>
           </a:p>
         </p:txBody>
       </p:sp>
@@ -1000,9 +1000,9 @@
           <a:p>
             <a:fld id="{78C97017-6FC3-485B-9764-EAC9E56C1D49}" type="datetimeFigureOut">
               <a:rPr lang="en-US" smtClean="0"/>
-              <a:t>11/10/18</a:t>
+              <a:t>11/12/18</a:t>
             </a:fld>
-            <a:endParaRPr lang="en-US"/>
+            <a:endParaRPr lang="en-US" dirty="0"/>
           </a:p>
         </p:txBody>
       </p:sp>
@@ -1021,7 +1021,7 @@
           <a:bodyPr/>
           <a:lstStyle/>
           <a:p>
-            <a:endParaRPr lang="en-US"/>
+            <a:endParaRPr lang="en-US" dirty="0"/>
           </a:p>
         </p:txBody>
       </p:sp>
@@ -1044,7 +1044,7 @@
               <a:rPr lang="en-US" smtClean="0"/>
               <a:t>‹#›</a:t>
             </a:fld>
-            <a:endParaRPr lang="en-US"/>
+            <a:endParaRPr lang="en-US" dirty="0"/>
           </a:p>
         </p:txBody>
       </p:sp>
@@ -1168,9 +1168,9 @@
           <a:p>
             <a:fld id="{78C97017-6FC3-485B-9764-EAC9E56C1D49}" type="datetimeFigureOut">
               <a:rPr lang="en-US" smtClean="0"/>
-              <a:t>11/10/18</a:t>
+              <a:t>11/12/18</a:t>
             </a:fld>
-            <a:endParaRPr lang="en-US"/>
+            <a:endParaRPr lang="en-US" dirty="0"/>
           </a:p>
         </p:txBody>
       </p:sp>
@@ -1189,7 +1189,7 @@
           <a:bodyPr/>
           <a:lstStyle/>
           <a:p>
-            <a:endParaRPr lang="en-US"/>
+            <a:endParaRPr lang="en-US" dirty="0"/>
           </a:p>
         </p:txBody>
       </p:sp>
@@ -1212,7 +1212,7 @@
               <a:rPr lang="en-US" smtClean="0"/>
               <a:t>‹#›</a:t>
             </a:fld>
-            <a:endParaRPr lang="en-US"/>
+            <a:endParaRPr lang="en-US" dirty="0"/>
           </a:p>
         </p:txBody>
       </p:sp>
@@ -1413,9 +1413,9 @@
           <a:p>
             <a:fld id="{78C97017-6FC3-485B-9764-EAC9E56C1D49}" type="datetimeFigureOut">
               <a:rPr lang="en-US" smtClean="0"/>
-              <a:t>11/10/18</a:t>
+              <a:t>11/12/18</a:t>
             </a:fld>
-            <a:endParaRPr lang="en-US"/>
+            <a:endParaRPr lang="en-US" dirty="0"/>
           </a:p>
         </p:txBody>
       </p:sp>
@@ -1434,7 +1434,7 @@
           <a:bodyPr/>
           <a:lstStyle/>
           <a:p>
-            <a:endParaRPr lang="en-US"/>
+            <a:endParaRPr lang="en-US" dirty="0"/>
           </a:p>
         </p:txBody>
       </p:sp>
@@ -1457,7 +1457,7 @@
               <a:rPr lang="en-US" smtClean="0"/>
               <a:t>‹#›</a:t>
             </a:fld>
-            <a:endParaRPr lang="en-US"/>
+            <a:endParaRPr lang="en-US" dirty="0"/>
           </a:p>
         </p:txBody>
       </p:sp>
@@ -1698,9 +1698,9 @@
           <a:p>
             <a:fld id="{78C97017-6FC3-485B-9764-EAC9E56C1D49}" type="datetimeFigureOut">
               <a:rPr lang="en-US" smtClean="0"/>
-              <a:t>11/10/18</a:t>
+              <a:t>11/12/18</a:t>
             </a:fld>
-            <a:endParaRPr lang="en-US"/>
+            <a:endParaRPr lang="en-US" dirty="0"/>
           </a:p>
         </p:txBody>
       </p:sp>
@@ -1719,7 +1719,7 @@
           <a:bodyPr/>
           <a:lstStyle/>
           <a:p>
-            <a:endParaRPr lang="en-US"/>
+            <a:endParaRPr lang="en-US" dirty="0"/>
           </a:p>
         </p:txBody>
       </p:sp>
@@ -1742,7 +1742,7 @@
               <a:rPr lang="en-US" smtClean="0"/>
               <a:t>‹#›</a:t>
             </a:fld>
-            <a:endParaRPr lang="en-US"/>
+            <a:endParaRPr lang="en-US" dirty="0"/>
           </a:p>
         </p:txBody>
       </p:sp>
@@ -2117,9 +2117,9 @@
           <a:p>
             <a:fld id="{78C97017-6FC3-485B-9764-EAC9E56C1D49}" type="datetimeFigureOut">
               <a:rPr lang="en-US" smtClean="0"/>
-              <a:t>11/10/18</a:t>
+              <a:t>11/12/18</a:t>
             </a:fld>
-            <a:endParaRPr lang="en-US"/>
+            <a:endParaRPr lang="en-US" dirty="0"/>
           </a:p>
         </p:txBody>
       </p:sp>
@@ -2138,7 +2138,7 @@
           <a:bodyPr/>
           <a:lstStyle/>
           <a:p>
-            <a:endParaRPr lang="en-US"/>
+            <a:endParaRPr lang="en-US" dirty="0"/>
           </a:p>
         </p:txBody>
       </p:sp>
@@ -2161,7 +2161,7 @@
               <a:rPr lang="en-US" smtClean="0"/>
               <a:t>‹#›</a:t>
             </a:fld>
-            <a:endParaRPr lang="en-US"/>
+            <a:endParaRPr lang="en-US" dirty="0"/>
           </a:p>
         </p:txBody>
       </p:sp>
@@ -2234,9 +2234,9 @@
           <a:p>
             <a:fld id="{78C97017-6FC3-485B-9764-EAC9E56C1D49}" type="datetimeFigureOut">
               <a:rPr lang="en-US" smtClean="0"/>
-              <a:t>11/10/18</a:t>
+              <a:t>11/12/18</a:t>
             </a:fld>
-            <a:endParaRPr lang="en-US"/>
+            <a:endParaRPr lang="en-US" dirty="0"/>
           </a:p>
         </p:txBody>
       </p:sp>
@@ -2255,7 +2255,7 @@
           <a:bodyPr/>
           <a:lstStyle/>
           <a:p>
-            <a:endParaRPr lang="en-US"/>
+            <a:endParaRPr lang="en-US" dirty="0"/>
           </a:p>
         </p:txBody>
       </p:sp>
@@ -2278,7 +2278,7 @@
               <a:rPr lang="en-US" smtClean="0"/>
               <a:t>‹#›</a:t>
             </a:fld>
-            <a:endParaRPr lang="en-US"/>
+            <a:endParaRPr lang="en-US" dirty="0"/>
           </a:p>
         </p:txBody>
       </p:sp>
@@ -2329,9 +2329,9 @@
           <a:p>
             <a:fld id="{78C97017-6FC3-485B-9764-EAC9E56C1D49}" type="datetimeFigureOut">
               <a:rPr lang="en-US" smtClean="0"/>
-              <a:t>11/10/18</a:t>
+              <a:t>11/12/18</a:t>
             </a:fld>
-            <a:endParaRPr lang="en-US"/>
+            <a:endParaRPr lang="en-US" dirty="0"/>
           </a:p>
         </p:txBody>
       </p:sp>
@@ -2350,7 +2350,7 @@
           <a:bodyPr/>
           <a:lstStyle/>
           <a:p>
-            <a:endParaRPr lang="en-US"/>
+            <a:endParaRPr lang="en-US" dirty="0"/>
           </a:p>
         </p:txBody>
       </p:sp>
@@ -2373,7 +2373,7 @@
               <a:rPr lang="en-US" smtClean="0"/>
               <a:t>‹#›</a:t>
             </a:fld>
-            <a:endParaRPr lang="en-US"/>
+            <a:endParaRPr lang="en-US" dirty="0"/>
           </a:p>
         </p:txBody>
       </p:sp>
@@ -2604,9 +2604,9 @@
           <a:p>
             <a:fld id="{78C97017-6FC3-485B-9764-EAC9E56C1D49}" type="datetimeFigureOut">
               <a:rPr lang="en-US" smtClean="0"/>
-              <a:t>11/10/18</a:t>
+              <a:t>11/12/18</a:t>
             </a:fld>
-            <a:endParaRPr lang="en-US"/>
+            <a:endParaRPr lang="en-US" dirty="0"/>
           </a:p>
         </p:txBody>
       </p:sp>
@@ -2625,7 +2625,7 @@
           <a:bodyPr/>
           <a:lstStyle/>
           <a:p>
-            <a:endParaRPr lang="en-US"/>
+            <a:endParaRPr lang="en-US" dirty="0"/>
           </a:p>
         </p:txBody>
       </p:sp>
@@ -2648,7 +2648,7 @@
               <a:rPr lang="en-US" smtClean="0"/>
               <a:t>‹#›</a:t>
             </a:fld>
-            <a:endParaRPr lang="en-US"/>
+            <a:endParaRPr lang="en-US" dirty="0"/>
           </a:p>
         </p:txBody>
       </p:sp>
@@ -2770,7 +2770,7 @@
             </a:lvl9pPr>
           </a:lstStyle>
           <a:p>
-            <a:endParaRPr lang="en-US"/>
+            <a:endParaRPr lang="en-US" dirty="0"/>
           </a:p>
         </p:txBody>
       </p:sp>
@@ -2856,9 +2856,9 @@
           <a:p>
             <a:fld id="{78C97017-6FC3-485B-9764-EAC9E56C1D49}" type="datetimeFigureOut">
               <a:rPr lang="en-US" smtClean="0"/>
-              <a:t>11/10/18</a:t>
+              <a:t>11/12/18</a:t>
             </a:fld>
-            <a:endParaRPr lang="en-US"/>
+            <a:endParaRPr lang="en-US" dirty="0"/>
           </a:p>
         </p:txBody>
       </p:sp>
@@ -2877,7 +2877,7 @@
           <a:bodyPr/>
           <a:lstStyle/>
           <a:p>
-            <a:endParaRPr lang="en-US"/>
+            <a:endParaRPr lang="en-US" dirty="0"/>
           </a:p>
         </p:txBody>
       </p:sp>
@@ -2900,7 +2900,7 @@
               <a:rPr lang="en-US" smtClean="0"/>
               <a:t>‹#›</a:t>
             </a:fld>
-            <a:endParaRPr lang="en-US"/>
+            <a:endParaRPr lang="en-US" dirty="0"/>
           </a:p>
         </p:txBody>
       </p:sp>
@@ -3067,9 +3067,9 @@
           <a:p>
             <a:fld id="{78C97017-6FC3-485B-9764-EAC9E56C1D49}" type="datetimeFigureOut">
               <a:rPr lang="en-US" smtClean="0"/>
-              <a:t>11/10/18</a:t>
+              <a:t>11/12/18</a:t>
             </a:fld>
-            <a:endParaRPr lang="en-US"/>
+            <a:endParaRPr lang="en-US" dirty="0"/>
           </a:p>
         </p:txBody>
       </p:sp>
@@ -3106,7 +3106,7 @@
             </a:lvl1pPr>
           </a:lstStyle>
           <a:p>
-            <a:endParaRPr lang="en-US"/>
+            <a:endParaRPr lang="en-US" dirty="0"/>
           </a:p>
         </p:txBody>
       </p:sp>
@@ -3147,7 +3147,7 @@
               <a:rPr lang="en-US" smtClean="0"/>
               <a:t>‹#›</a:t>
             </a:fld>
-            <a:endParaRPr lang="en-US"/>
+            <a:endParaRPr lang="en-US" dirty="0"/>
           </a:p>
         </p:txBody>
       </p:sp>
@@ -3613,15 +3613,7 @@
                   <a:schemeClr val="bg1"/>
                 </a:solidFill>
               </a:rPr>
-              <a:t>:</a:t>
-            </a:r>
-            <a:r>
-              <a:rPr lang="en-US" sz="1200" dirty="0" err="1">
-                <a:solidFill>
-                  <a:schemeClr val="bg1"/>
-                </a:solidFill>
-              </a:rPr>
-              <a:t>LogicManager</a:t>
+              <a:t>:LogicManager</a:t>
             </a:r>
             <a:endParaRPr lang="en-SG" sz="1200" dirty="0">
               <a:solidFill>
@@ -3766,15 +3758,7 @@
                   <a:schemeClr val="bg1"/>
                 </a:solidFill>
               </a:rPr>
-              <a:t>:</a:t>
-            </a:r>
-            <a:r>
-              <a:rPr lang="en-US" sz="1200" dirty="0" err="1">
-                <a:solidFill>
-                  <a:schemeClr val="bg1"/>
-                </a:solidFill>
-              </a:rPr>
-              <a:t>SchedulePlannerParser</a:t>
+              <a:t>:SchedulePlannerParser</a:t>
             </a:r>
             <a:endParaRPr lang="en-SG" sz="1200" dirty="0">
               <a:solidFill>
@@ -4004,7 +3988,7 @@
         </p:nvSpPr>
         <p:spPr>
           <a:xfrm>
-            <a:off x="-232414" y="953662"/>
+            <a:off x="-195330" y="953538"/>
             <a:ext cx="1424846" cy="184666"/>
           </a:xfrm>
           <a:prstGeom prst="rect">
@@ -4025,7 +4009,31 @@
                   <a:srgbClr val="0070C0"/>
                 </a:solidFill>
               </a:rPr>
-              <a:t>execute(“archive”)</a:t>
+              <a:t>execute(“archive</a:t>
+            </a:r>
+            <a:r>
+              <a:rPr lang="zh-CN" altLang="en-US" sz="1200">
+                <a:solidFill>
+                  <a:srgbClr val="0070C0"/>
+                </a:solidFill>
+              </a:rPr>
+              <a:t> </a:t>
+            </a:r>
+            <a:r>
+              <a:rPr lang="en-US" altLang="zh-CN" sz="1200" dirty="0">
+                <a:solidFill>
+                  <a:srgbClr val="0070C0"/>
+                </a:solidFill>
+              </a:rPr>
+              <a:t>1</a:t>
+            </a:r>
+            <a:r>
+              <a:rPr lang="en-US" sz="1200" dirty="0">
+                <a:solidFill>
+                  <a:srgbClr val="0070C0"/>
+                </a:solidFill>
+              </a:rPr>
+              <a:t>”)</a:t>
             </a:r>
           </a:p>
         </p:txBody>
@@ -4350,16 +4358,20 @@
           </a:lstStyle>
           <a:p>
             <a:r>
-              <a:rPr lang="en-US" sz="1200" dirty="0" err="1"/>
-              <a:t>parseCommand</a:t>
-            </a:r>
-            <a:r>
               <a:rPr lang="en-US" sz="1200" dirty="0"/>
-              <a:t>(“</a:t>
+              <a:t>parseCommand(“</a:t>
             </a:r>
             <a:r>
               <a:rPr lang="en-US" altLang="zh-CN" sz="1200" dirty="0"/>
               <a:t>archive</a:t>
+            </a:r>
+            <a:r>
+              <a:rPr lang="zh-CN" altLang="en-US" sz="1200"/>
+              <a:t> </a:t>
+            </a:r>
+            <a:r>
+              <a:rPr lang="en-US" altLang="zh-CN" sz="1200" dirty="0"/>
+              <a:t>1</a:t>
             </a:r>
             <a:r>
               <a:rPr lang="en-US" sz="1200" dirty="0"/>
@@ -4497,15 +4509,7 @@
                   <a:schemeClr val="bg1"/>
                 </a:solidFill>
               </a:rPr>
-              <a:t>:</a:t>
-            </a:r>
-            <a:r>
-              <a:rPr lang="en-US" sz="1200" dirty="0" err="1">
-                <a:solidFill>
-                  <a:schemeClr val="bg1"/>
-                </a:solidFill>
-              </a:rPr>
-              <a:t>VersionedSchedulePlanner</a:t>
+              <a:t>:VersionedSchedulePlanner</a:t>
             </a:r>
             <a:endParaRPr lang="en-SG" sz="1200" dirty="0">
               <a:solidFill>
@@ -4558,7 +4562,7 @@
           <a:lstStyle/>
           <a:p>
             <a:pPr algn="ctr"/>
-            <a:endParaRPr lang="en-SG" sz="1200"/>
+            <a:endParaRPr lang="en-SG" sz="1200" dirty="0"/>
           </a:p>
         </p:txBody>
       </p:sp>
@@ -4744,7 +4748,7 @@
           <a:lstStyle/>
           <a:p>
             <a:pPr algn="ctr"/>
-            <a:endParaRPr lang="en-SG" sz="1200"/>
+            <a:endParaRPr lang="en-SG" sz="1200" dirty="0"/>
           </a:p>
         </p:txBody>
       </p:sp>
@@ -4863,7 +4867,7 @@
           <a:p>
             <a:pPr algn="ctr"/>
             <a:r>
-              <a:rPr lang="en-US" altLang="zh-CN" sz="1200" dirty="0" err="1">
+              <a:rPr lang="en-US" altLang="zh-CN" sz="1200" dirty="0">
                 <a:solidFill>
                   <a:schemeClr val="bg1"/>
                 </a:solidFill>
@@ -4871,7 +4875,7 @@
               <a:t>a</a:t>
             </a:r>
             <a:r>
-              <a:rPr lang="en-US" sz="1200" dirty="0" err="1">
+              <a:rPr lang="en-US" sz="1200" dirty="0">
                 <a:solidFill>
                   <a:schemeClr val="bg1"/>
                 </a:solidFill>
@@ -4879,7 +4883,7 @@
               <a:t>:</a:t>
             </a:r>
             <a:r>
-              <a:rPr lang="en-US" altLang="zh-CN" sz="1200" dirty="0" err="1">
+              <a:rPr lang="en-US" altLang="zh-CN" sz="1200" dirty="0">
                 <a:solidFill>
                   <a:schemeClr val="bg1"/>
                 </a:solidFill>
@@ -5097,8 +5101,8 @@
         </p:nvSpPr>
         <p:spPr>
           <a:xfrm>
-            <a:off x="6671904" y="2967365"/>
-            <a:ext cx="1002846" cy="184666"/>
+            <a:off x="6525469" y="3167327"/>
+            <a:ext cx="1217878" cy="369332"/>
           </a:xfrm>
           <a:prstGeom prst="rect">
             <a:avLst/>
@@ -5134,13 +5138,15 @@
               <a:t>  </a:t>
             </a:r>
             <a:r>
-              <a:rPr lang="en-US" altLang="zh-CN" sz="1200" dirty="0" err="1">
+              <a:rPr lang="en-US" altLang="zh-CN" sz="1200" dirty="0">
                 <a:solidFill>
                   <a:srgbClr val="7030A0"/>
                 </a:solidFill>
               </a:rPr>
               <a:t>archiveTask</a:t>
             </a:r>
+          </a:p>
+          <a:p>
             <a:r>
               <a:rPr lang="en-US" sz="1200" dirty="0">
                 <a:solidFill>
@@ -5149,7 +5155,27 @@
                   </a:schemeClr>
                 </a:solidFill>
               </a:rPr>
-              <a:t>()</a:t>
+              <a:t>(</a:t>
+            </a:r>
+            <a:r>
+              <a:rPr lang="en-US" altLang="zh-CN" sz="1200" dirty="0">
+                <a:solidFill>
+                  <a:schemeClr val="accent4">
+                    <a:lumMod val="75000"/>
+                  </a:schemeClr>
+                </a:solidFill>
+              </a:rPr>
+              <a:t>taskToArchive</a:t>
+            </a:r>
+            <a:r>
+              <a:rPr lang="en-US" sz="1200" dirty="0">
+                <a:solidFill>
+                  <a:schemeClr val="accent4">
+                    <a:lumMod val="75000"/>
+                  </a:schemeClr>
+                </a:solidFill>
+              </a:rPr>
+              <a:t>)</a:t>
             </a:r>
           </a:p>
         </p:txBody>
@@ -5334,8 +5360,8 @@
         </p:nvSpPr>
         <p:spPr>
           <a:xfrm>
-            <a:off x="7763568" y="3354858"/>
-            <a:ext cx="1448717" cy="184666"/>
+            <a:off x="7938463" y="3288268"/>
+            <a:ext cx="1448717" cy="369332"/>
           </a:xfrm>
           <a:prstGeom prst="rect">
             <a:avLst/>
@@ -5360,7 +5386,7 @@
           </a:lstStyle>
           <a:p>
             <a:r>
-              <a:rPr lang="en-US" altLang="zh-CN" sz="1200" dirty="0" err="1">
+              <a:rPr lang="en-US" altLang="zh-CN" sz="1200" dirty="0">
                 <a:solidFill>
                   <a:schemeClr val="accent4">
                     <a:lumMod val="75000"/>
@@ -5369,6 +5395,8 @@
               </a:rPr>
               <a:t>archiveTask</a:t>
             </a:r>
+          </a:p>
+          <a:p>
             <a:r>
               <a:rPr lang="en-US" altLang="zh-CN" sz="1200" dirty="0">
                 <a:solidFill>
@@ -5377,7 +5405,7 @@
                   </a:schemeClr>
                 </a:solidFill>
               </a:rPr>
-              <a:t>()</a:t>
+              <a:t>(taskToArchive)</a:t>
             </a:r>
             <a:endParaRPr lang="en-US" sz="1200" dirty="0"/>
           </a:p>
@@ -5719,7 +5747,7 @@
           <a:lstStyle/>
           <a:p>
             <a:pPr algn="ctr"/>
-            <a:endParaRPr lang="en-US"/>
+            <a:endParaRPr lang="en-US" dirty="0"/>
           </a:p>
         </p:txBody>
       </p:sp>

</xml_diff>